<commit_message>
Added materials for 60_Angular
Several exercise and example apps.
</commit_message>
<xml_diff>
--- a/60_Angular/Angular.pptx
+++ b/60_Angular/Angular.pptx
@@ -288,7 +288,7 @@
           <a:p>
             <a:fld id="{04527E70-C461-477F-BF52-CFCF7D612977}" type="datetimeFigureOut">
               <a:rPr lang="da-DK" smtClean="0"/>
-              <a:t>03-04-2019</a:t>
+              <a:t>04-04-2019</a:t>
             </a:fld>
             <a:endParaRPr lang="da-DK"/>
           </a:p>
@@ -458,7 +458,7 @@
           <a:p>
             <a:fld id="{04527E70-C461-477F-BF52-CFCF7D612977}" type="datetimeFigureOut">
               <a:rPr lang="da-DK" smtClean="0"/>
-              <a:t>03-04-2019</a:t>
+              <a:t>04-04-2019</a:t>
             </a:fld>
             <a:endParaRPr lang="da-DK"/>
           </a:p>
@@ -638,7 +638,7 @@
           <a:p>
             <a:fld id="{04527E70-C461-477F-BF52-CFCF7D612977}" type="datetimeFigureOut">
               <a:rPr lang="da-DK" smtClean="0"/>
-              <a:t>03-04-2019</a:t>
+              <a:t>04-04-2019</a:t>
             </a:fld>
             <a:endParaRPr lang="da-DK"/>
           </a:p>
@@ -808,7 +808,7 @@
           <a:p>
             <a:fld id="{04527E70-C461-477F-BF52-CFCF7D612977}" type="datetimeFigureOut">
               <a:rPr lang="da-DK" smtClean="0"/>
-              <a:t>03-04-2019</a:t>
+              <a:t>04-04-2019</a:t>
             </a:fld>
             <a:endParaRPr lang="da-DK"/>
           </a:p>
@@ -1054,7 +1054,7 @@
           <a:p>
             <a:fld id="{04527E70-C461-477F-BF52-CFCF7D612977}" type="datetimeFigureOut">
               <a:rPr lang="da-DK" smtClean="0"/>
-              <a:t>03-04-2019</a:t>
+              <a:t>04-04-2019</a:t>
             </a:fld>
             <a:endParaRPr lang="da-DK"/>
           </a:p>
@@ -1286,7 +1286,7 @@
           <a:p>
             <a:fld id="{04527E70-C461-477F-BF52-CFCF7D612977}" type="datetimeFigureOut">
               <a:rPr lang="da-DK" smtClean="0"/>
-              <a:t>03-04-2019</a:t>
+              <a:t>04-04-2019</a:t>
             </a:fld>
             <a:endParaRPr lang="da-DK"/>
           </a:p>
@@ -1653,7 +1653,7 @@
           <a:p>
             <a:fld id="{04527E70-C461-477F-BF52-CFCF7D612977}" type="datetimeFigureOut">
               <a:rPr lang="da-DK" smtClean="0"/>
-              <a:t>03-04-2019</a:t>
+              <a:t>04-04-2019</a:t>
             </a:fld>
             <a:endParaRPr lang="da-DK"/>
           </a:p>
@@ -1771,7 +1771,7 @@
           <a:p>
             <a:fld id="{04527E70-C461-477F-BF52-CFCF7D612977}" type="datetimeFigureOut">
               <a:rPr lang="da-DK" smtClean="0"/>
-              <a:t>03-04-2019</a:t>
+              <a:t>04-04-2019</a:t>
             </a:fld>
             <a:endParaRPr lang="da-DK"/>
           </a:p>
@@ -1866,7 +1866,7 @@
           <a:p>
             <a:fld id="{04527E70-C461-477F-BF52-CFCF7D612977}" type="datetimeFigureOut">
               <a:rPr lang="da-DK" smtClean="0"/>
-              <a:t>03-04-2019</a:t>
+              <a:t>04-04-2019</a:t>
             </a:fld>
             <a:endParaRPr lang="da-DK"/>
           </a:p>
@@ -2143,7 +2143,7 @@
           <a:p>
             <a:fld id="{04527E70-C461-477F-BF52-CFCF7D612977}" type="datetimeFigureOut">
               <a:rPr lang="da-DK" smtClean="0"/>
-              <a:t>03-04-2019</a:t>
+              <a:t>04-04-2019</a:t>
             </a:fld>
             <a:endParaRPr lang="da-DK"/>
           </a:p>
@@ -2396,7 +2396,7 @@
           <a:p>
             <a:fld id="{04527E70-C461-477F-BF52-CFCF7D612977}" type="datetimeFigureOut">
               <a:rPr lang="da-DK" smtClean="0"/>
-              <a:t>03-04-2019</a:t>
+              <a:t>04-04-2019</a:t>
             </a:fld>
             <a:endParaRPr lang="da-DK"/>
           </a:p>
@@ -2609,7 +2609,7 @@
           <a:p>
             <a:fld id="{04527E70-C461-477F-BF52-CFCF7D612977}" type="datetimeFigureOut">
               <a:rPr lang="da-DK" smtClean="0"/>
-              <a:t>03-04-2019</a:t>
+              <a:t>04-04-2019</a:t>
             </a:fld>
             <a:endParaRPr lang="da-DK"/>
           </a:p>
@@ -5189,9 +5189,88 @@
   <p:timing>
     <p:tnLst>
       <p:par>
-        <p:cTn id="1" dur="indefinite" restart="never" nodeType="tmRoot"/>
+        <p:cTn id="1" dur="indefinite" restart="never" nodeType="tmRoot">
+          <p:childTnLst>
+            <p:seq concurrent="1" nextAc="seek">
+              <p:cTn id="2" dur="indefinite" nodeType="mainSeq">
+                <p:childTnLst>
+                  <p:par>
+                    <p:cTn id="3" fill="hold">
+                      <p:stCondLst>
+                        <p:cond delay="indefinite"/>
+                      </p:stCondLst>
+                      <p:childTnLst>
+                        <p:par>
+                          <p:cTn id="4" fill="hold">
+                            <p:stCondLst>
+                              <p:cond delay="0"/>
+                            </p:stCondLst>
+                            <p:childTnLst>
+                              <p:par>
+                                <p:cTn id="5" presetID="10" presetClass="entr" presetSubtype="0" fill="hold" grpId="0" nodeType="clickEffect">
+                                  <p:stCondLst>
+                                    <p:cond delay="0"/>
+                                  </p:stCondLst>
+                                  <p:childTnLst>
+                                    <p:set>
+                                      <p:cBhvr>
+                                        <p:cTn id="6" dur="1" fill="hold">
+                                          <p:stCondLst>
+                                            <p:cond delay="0"/>
+                                          </p:stCondLst>
+                                        </p:cTn>
+                                        <p:tgtEl>
+                                          <p:spTgt spid="7"/>
+                                        </p:tgtEl>
+                                        <p:attrNameLst>
+                                          <p:attrName>style.visibility</p:attrName>
+                                        </p:attrNameLst>
+                                      </p:cBhvr>
+                                      <p:to>
+                                        <p:strVal val="visible"/>
+                                      </p:to>
+                                    </p:set>
+                                    <p:animEffect transition="in" filter="fade">
+                                      <p:cBhvr>
+                                        <p:cTn id="7" dur="500"/>
+                                        <p:tgtEl>
+                                          <p:spTgt spid="7"/>
+                                        </p:tgtEl>
+                                      </p:cBhvr>
+                                    </p:animEffect>
+                                  </p:childTnLst>
+                                </p:cTn>
+                              </p:par>
+                            </p:childTnLst>
+                          </p:cTn>
+                        </p:par>
+                      </p:childTnLst>
+                    </p:cTn>
+                  </p:par>
+                </p:childTnLst>
+              </p:cTn>
+              <p:prevCondLst>
+                <p:cond evt="onPrev" delay="0">
+                  <p:tgtEl>
+                    <p:sldTgt/>
+                  </p:tgtEl>
+                </p:cond>
+              </p:prevCondLst>
+              <p:nextCondLst>
+                <p:cond evt="onNext" delay="0">
+                  <p:tgtEl>
+                    <p:sldTgt/>
+                  </p:tgtEl>
+                </p:cond>
+              </p:nextCondLst>
+            </p:seq>
+          </p:childTnLst>
+        </p:cTn>
       </p:par>
     </p:tnLst>
+    <p:bldLst>
+      <p:bldP spid="7" grpId="0" animBg="1"/>
+    </p:bldLst>
   </p:timing>
 </p:sld>
 </file>
@@ -6162,9 +6241,88 @@
   <p:timing>
     <p:tnLst>
       <p:par>
-        <p:cTn id="1" dur="indefinite" restart="never" nodeType="tmRoot"/>
+        <p:cTn id="1" dur="indefinite" restart="never" nodeType="tmRoot">
+          <p:childTnLst>
+            <p:seq concurrent="1" nextAc="seek">
+              <p:cTn id="2" dur="indefinite" nodeType="mainSeq">
+                <p:childTnLst>
+                  <p:par>
+                    <p:cTn id="3" fill="hold">
+                      <p:stCondLst>
+                        <p:cond delay="indefinite"/>
+                      </p:stCondLst>
+                      <p:childTnLst>
+                        <p:par>
+                          <p:cTn id="4" fill="hold">
+                            <p:stCondLst>
+                              <p:cond delay="0"/>
+                            </p:stCondLst>
+                            <p:childTnLst>
+                              <p:par>
+                                <p:cTn id="5" presetID="10" presetClass="entr" presetSubtype="0" fill="hold" grpId="0" nodeType="clickEffect">
+                                  <p:stCondLst>
+                                    <p:cond delay="0"/>
+                                  </p:stCondLst>
+                                  <p:childTnLst>
+                                    <p:set>
+                                      <p:cBhvr>
+                                        <p:cTn id="6" dur="1" fill="hold">
+                                          <p:stCondLst>
+                                            <p:cond delay="0"/>
+                                          </p:stCondLst>
+                                        </p:cTn>
+                                        <p:tgtEl>
+                                          <p:spTgt spid="3"/>
+                                        </p:tgtEl>
+                                        <p:attrNameLst>
+                                          <p:attrName>style.visibility</p:attrName>
+                                        </p:attrNameLst>
+                                      </p:cBhvr>
+                                      <p:to>
+                                        <p:strVal val="visible"/>
+                                      </p:to>
+                                    </p:set>
+                                    <p:animEffect transition="in" filter="fade">
+                                      <p:cBhvr>
+                                        <p:cTn id="7" dur="500"/>
+                                        <p:tgtEl>
+                                          <p:spTgt spid="3"/>
+                                        </p:tgtEl>
+                                      </p:cBhvr>
+                                    </p:animEffect>
+                                  </p:childTnLst>
+                                </p:cTn>
+                              </p:par>
+                            </p:childTnLst>
+                          </p:cTn>
+                        </p:par>
+                      </p:childTnLst>
+                    </p:cTn>
+                  </p:par>
+                </p:childTnLst>
+              </p:cTn>
+              <p:prevCondLst>
+                <p:cond evt="onPrev" delay="0">
+                  <p:tgtEl>
+                    <p:sldTgt/>
+                  </p:tgtEl>
+                </p:cond>
+              </p:prevCondLst>
+              <p:nextCondLst>
+                <p:cond evt="onNext" delay="0">
+                  <p:tgtEl>
+                    <p:sldTgt/>
+                  </p:tgtEl>
+                </p:cond>
+              </p:nextCondLst>
+            </p:seq>
+          </p:childTnLst>
+        </p:cTn>
       </p:par>
     </p:tnLst>
+    <p:bldLst>
+      <p:bldP spid="3" grpId="0" animBg="1"/>
+    </p:bldLst>
   </p:timing>
 </p:sld>
 </file>
@@ -6913,9 +7071,124 @@
   <p:timing>
     <p:tnLst>
       <p:par>
-        <p:cTn id="1" dur="indefinite" restart="never" nodeType="tmRoot"/>
+        <p:cTn id="1" dur="indefinite" restart="never" nodeType="tmRoot">
+          <p:childTnLst>
+            <p:seq concurrent="1" nextAc="seek">
+              <p:cTn id="2" dur="indefinite" nodeType="mainSeq">
+                <p:childTnLst>
+                  <p:par>
+                    <p:cTn id="3" fill="hold">
+                      <p:stCondLst>
+                        <p:cond delay="indefinite"/>
+                      </p:stCondLst>
+                      <p:childTnLst>
+                        <p:par>
+                          <p:cTn id="4" fill="hold">
+                            <p:stCondLst>
+                              <p:cond delay="0"/>
+                            </p:stCondLst>
+                            <p:childTnLst>
+                              <p:par>
+                                <p:cTn id="5" presetID="10" presetClass="entr" presetSubtype="0" fill="hold" grpId="0" nodeType="clickEffect">
+                                  <p:stCondLst>
+                                    <p:cond delay="0"/>
+                                  </p:stCondLst>
+                                  <p:childTnLst>
+                                    <p:set>
+                                      <p:cBhvr>
+                                        <p:cTn id="6" dur="1" fill="hold">
+                                          <p:stCondLst>
+                                            <p:cond delay="0"/>
+                                          </p:stCondLst>
+                                        </p:cTn>
+                                        <p:tgtEl>
+                                          <p:spTgt spid="3"/>
+                                        </p:tgtEl>
+                                        <p:attrNameLst>
+                                          <p:attrName>style.visibility</p:attrName>
+                                        </p:attrNameLst>
+                                      </p:cBhvr>
+                                      <p:to>
+                                        <p:strVal val="visible"/>
+                                      </p:to>
+                                    </p:set>
+                                    <p:animEffect transition="in" filter="fade">
+                                      <p:cBhvr>
+                                        <p:cTn id="7" dur="500"/>
+                                        <p:tgtEl>
+                                          <p:spTgt spid="3"/>
+                                        </p:tgtEl>
+                                      </p:cBhvr>
+                                    </p:animEffect>
+                                  </p:childTnLst>
+                                </p:cTn>
+                              </p:par>
+                              <p:par>
+                                <p:cTn id="8" presetID="10" presetClass="entr" presetSubtype="0" fill="hold" grpId="0" nodeType="withEffect">
+                                  <p:stCondLst>
+                                    <p:cond delay="0"/>
+                                  </p:stCondLst>
+                                  <p:childTnLst>
+                                    <p:set>
+                                      <p:cBhvr>
+                                        <p:cTn id="9" dur="1" fill="hold">
+                                          <p:stCondLst>
+                                            <p:cond delay="0"/>
+                                          </p:stCondLst>
+                                        </p:cTn>
+                                        <p:tgtEl>
+                                          <p:spTgt spid="5"/>
+                                        </p:tgtEl>
+                                        <p:attrNameLst>
+                                          <p:attrName>style.visibility</p:attrName>
+                                        </p:attrNameLst>
+                                      </p:cBhvr>
+                                      <p:to>
+                                        <p:strVal val="visible"/>
+                                      </p:to>
+                                    </p:set>
+                                    <p:animEffect transition="in" filter="fade">
+                                      <p:cBhvr>
+                                        <p:cTn id="10" dur="500"/>
+                                        <p:tgtEl>
+                                          <p:spTgt spid="5"/>
+                                        </p:tgtEl>
+                                      </p:cBhvr>
+                                    </p:animEffect>
+                                  </p:childTnLst>
+                                </p:cTn>
+                              </p:par>
+                            </p:childTnLst>
+                          </p:cTn>
+                        </p:par>
+                      </p:childTnLst>
+                    </p:cTn>
+                  </p:par>
+                </p:childTnLst>
+              </p:cTn>
+              <p:prevCondLst>
+                <p:cond evt="onPrev" delay="0">
+                  <p:tgtEl>
+                    <p:sldTgt/>
+                  </p:tgtEl>
+                </p:cond>
+              </p:prevCondLst>
+              <p:nextCondLst>
+                <p:cond evt="onNext" delay="0">
+                  <p:tgtEl>
+                    <p:sldTgt/>
+                  </p:tgtEl>
+                </p:cond>
+              </p:nextCondLst>
+            </p:seq>
+          </p:childTnLst>
+        </p:cTn>
       </p:par>
     </p:tnLst>
+    <p:bldLst>
+      <p:bldP spid="3" grpId="0" animBg="1"/>
+      <p:bldP spid="5" grpId="0" animBg="1"/>
+    </p:bldLst>
   </p:timing>
 </p:sld>
 </file>
@@ -7710,9 +7983,124 @@
   <p:timing>
     <p:tnLst>
       <p:par>
-        <p:cTn id="1" dur="indefinite" restart="never" nodeType="tmRoot"/>
+        <p:cTn id="1" dur="indefinite" restart="never" nodeType="tmRoot">
+          <p:childTnLst>
+            <p:seq concurrent="1" nextAc="seek">
+              <p:cTn id="2" dur="indefinite" nodeType="mainSeq">
+                <p:childTnLst>
+                  <p:par>
+                    <p:cTn id="3" fill="hold">
+                      <p:stCondLst>
+                        <p:cond delay="indefinite"/>
+                      </p:stCondLst>
+                      <p:childTnLst>
+                        <p:par>
+                          <p:cTn id="4" fill="hold">
+                            <p:stCondLst>
+                              <p:cond delay="0"/>
+                            </p:stCondLst>
+                            <p:childTnLst>
+                              <p:par>
+                                <p:cTn id="5" presetID="10" presetClass="entr" presetSubtype="0" fill="hold" grpId="0" nodeType="clickEffect">
+                                  <p:stCondLst>
+                                    <p:cond delay="0"/>
+                                  </p:stCondLst>
+                                  <p:childTnLst>
+                                    <p:set>
+                                      <p:cBhvr>
+                                        <p:cTn id="6" dur="1" fill="hold">
+                                          <p:stCondLst>
+                                            <p:cond delay="0"/>
+                                          </p:stCondLst>
+                                        </p:cTn>
+                                        <p:tgtEl>
+                                          <p:spTgt spid="3"/>
+                                        </p:tgtEl>
+                                        <p:attrNameLst>
+                                          <p:attrName>style.visibility</p:attrName>
+                                        </p:attrNameLst>
+                                      </p:cBhvr>
+                                      <p:to>
+                                        <p:strVal val="visible"/>
+                                      </p:to>
+                                    </p:set>
+                                    <p:animEffect transition="in" filter="fade">
+                                      <p:cBhvr>
+                                        <p:cTn id="7" dur="500"/>
+                                        <p:tgtEl>
+                                          <p:spTgt spid="3"/>
+                                        </p:tgtEl>
+                                      </p:cBhvr>
+                                    </p:animEffect>
+                                  </p:childTnLst>
+                                </p:cTn>
+                              </p:par>
+                              <p:par>
+                                <p:cTn id="8" presetID="10" presetClass="entr" presetSubtype="0" fill="hold" grpId="0" nodeType="withEffect">
+                                  <p:stCondLst>
+                                    <p:cond delay="0"/>
+                                  </p:stCondLst>
+                                  <p:childTnLst>
+                                    <p:set>
+                                      <p:cBhvr>
+                                        <p:cTn id="9" dur="1" fill="hold">
+                                          <p:stCondLst>
+                                            <p:cond delay="0"/>
+                                          </p:stCondLst>
+                                        </p:cTn>
+                                        <p:tgtEl>
+                                          <p:spTgt spid="5"/>
+                                        </p:tgtEl>
+                                        <p:attrNameLst>
+                                          <p:attrName>style.visibility</p:attrName>
+                                        </p:attrNameLst>
+                                      </p:cBhvr>
+                                      <p:to>
+                                        <p:strVal val="visible"/>
+                                      </p:to>
+                                    </p:set>
+                                    <p:animEffect transition="in" filter="fade">
+                                      <p:cBhvr>
+                                        <p:cTn id="10" dur="500"/>
+                                        <p:tgtEl>
+                                          <p:spTgt spid="5"/>
+                                        </p:tgtEl>
+                                      </p:cBhvr>
+                                    </p:animEffect>
+                                  </p:childTnLst>
+                                </p:cTn>
+                              </p:par>
+                            </p:childTnLst>
+                          </p:cTn>
+                        </p:par>
+                      </p:childTnLst>
+                    </p:cTn>
+                  </p:par>
+                </p:childTnLst>
+              </p:cTn>
+              <p:prevCondLst>
+                <p:cond evt="onPrev" delay="0">
+                  <p:tgtEl>
+                    <p:sldTgt/>
+                  </p:tgtEl>
+                </p:cond>
+              </p:prevCondLst>
+              <p:nextCondLst>
+                <p:cond evt="onNext" delay="0">
+                  <p:tgtEl>
+                    <p:sldTgt/>
+                  </p:tgtEl>
+                </p:cond>
+              </p:nextCondLst>
+            </p:seq>
+          </p:childTnLst>
+        </p:cTn>
       </p:par>
     </p:tnLst>
+    <p:bldLst>
+      <p:bldP spid="3" grpId="0" animBg="1"/>
+      <p:bldP spid="5" grpId="0" animBg="1"/>
+    </p:bldLst>
   </p:timing>
 </p:sld>
 </file>
@@ -8130,11 +8518,7 @@
           <a:p>
             <a:r>
               <a:rPr lang="da-DK" b="1" smtClean="0"/>
-              <a:t>Angular – </a:t>
-            </a:r>
-            <a:r>
-              <a:rPr lang="da-DK" b="1" smtClean="0"/>
-              <a:t>using Bootstrap for styling</a:t>
+              <a:t>Angular – using Bootstrap for styling</a:t>
             </a:r>
             <a:endParaRPr lang="da-DK" b="1"/>
           </a:p>
@@ -8181,7 +8565,6 @@
               <a:rPr lang="da-DK" sz="2800" smtClean="0"/>
               <a:t>Open terminal window, go to app project folder</a:t>
             </a:r>
-            <a:endParaRPr lang="da-DK" sz="2800" smtClean="0"/>
           </a:p>
           <a:p>
             <a:pPr lvl="1"/>
@@ -8207,7 +8590,15 @@
                   <a:srgbClr val="00B0F0"/>
                 </a:solidFill>
               </a:rPr>
-              <a:t>npm install bootstrap</a:t>
+              <a:t>npm install </a:t>
+            </a:r>
+            <a:r>
+              <a:rPr lang="da-DK" sz="2800" b="1" smtClean="0">
+                <a:solidFill>
+                  <a:srgbClr val="00B0F0"/>
+                </a:solidFill>
+              </a:rPr>
+              <a:t>bootstrap jquery popper</a:t>
             </a:r>
             <a:endParaRPr lang="da-DK" sz="2800" smtClean="0"/>
           </a:p>
@@ -8684,9 +9075,88 @@
   <p:timing>
     <p:tnLst>
       <p:par>
-        <p:cTn id="1" dur="indefinite" restart="never" nodeType="tmRoot"/>
+        <p:cTn id="1" dur="indefinite" restart="never" nodeType="tmRoot">
+          <p:childTnLst>
+            <p:seq concurrent="1" nextAc="seek">
+              <p:cTn id="2" dur="indefinite" nodeType="mainSeq">
+                <p:childTnLst>
+                  <p:par>
+                    <p:cTn id="3" fill="hold">
+                      <p:stCondLst>
+                        <p:cond delay="indefinite"/>
+                      </p:stCondLst>
+                      <p:childTnLst>
+                        <p:par>
+                          <p:cTn id="4" fill="hold">
+                            <p:stCondLst>
+                              <p:cond delay="0"/>
+                            </p:stCondLst>
+                            <p:childTnLst>
+                              <p:par>
+                                <p:cTn id="5" presetID="10" presetClass="entr" presetSubtype="0" fill="hold" grpId="0" nodeType="clickEffect">
+                                  <p:stCondLst>
+                                    <p:cond delay="0"/>
+                                  </p:stCondLst>
+                                  <p:childTnLst>
+                                    <p:set>
+                                      <p:cBhvr>
+                                        <p:cTn id="6" dur="1" fill="hold">
+                                          <p:stCondLst>
+                                            <p:cond delay="0"/>
+                                          </p:stCondLst>
+                                        </p:cTn>
+                                        <p:tgtEl>
+                                          <p:spTgt spid="5"/>
+                                        </p:tgtEl>
+                                        <p:attrNameLst>
+                                          <p:attrName>style.visibility</p:attrName>
+                                        </p:attrNameLst>
+                                      </p:cBhvr>
+                                      <p:to>
+                                        <p:strVal val="visible"/>
+                                      </p:to>
+                                    </p:set>
+                                    <p:animEffect transition="in" filter="fade">
+                                      <p:cBhvr>
+                                        <p:cTn id="7" dur="500"/>
+                                        <p:tgtEl>
+                                          <p:spTgt spid="5"/>
+                                        </p:tgtEl>
+                                      </p:cBhvr>
+                                    </p:animEffect>
+                                  </p:childTnLst>
+                                </p:cTn>
+                              </p:par>
+                            </p:childTnLst>
+                          </p:cTn>
+                        </p:par>
+                      </p:childTnLst>
+                    </p:cTn>
+                  </p:par>
+                </p:childTnLst>
+              </p:cTn>
+              <p:prevCondLst>
+                <p:cond evt="onPrev" delay="0">
+                  <p:tgtEl>
+                    <p:sldTgt/>
+                  </p:tgtEl>
+                </p:cond>
+              </p:prevCondLst>
+              <p:nextCondLst>
+                <p:cond evt="onNext" delay="0">
+                  <p:tgtEl>
+                    <p:sldTgt/>
+                  </p:tgtEl>
+                </p:cond>
+              </p:nextCondLst>
+            </p:seq>
+          </p:childTnLst>
+        </p:cTn>
       </p:par>
     </p:tnLst>
+    <p:bldLst>
+      <p:bldP spid="5" grpId="0" animBg="1"/>
+    </p:bldLst>
   </p:timing>
 </p:sld>
 </file>
@@ -9175,6 +9645,13 @@
   <p:clrMapOvr>
     <a:masterClrMapping/>
   </p:clrMapOvr>
+  <p:timing>
+    <p:tnLst>
+      <p:par>
+        <p:cTn id="1" dur="indefinite" restart="never" nodeType="tmRoot"/>
+      </p:par>
+    </p:tnLst>
+  </p:timing>
 </p:sld>
 </file>
 
@@ -13171,9 +13648,124 @@
   <p:timing>
     <p:tnLst>
       <p:par>
-        <p:cTn id="1" dur="indefinite" restart="never" nodeType="tmRoot"/>
+        <p:cTn id="1" dur="indefinite" restart="never" nodeType="tmRoot">
+          <p:childTnLst>
+            <p:seq concurrent="1" nextAc="seek">
+              <p:cTn id="2" dur="indefinite" nodeType="mainSeq">
+                <p:childTnLst>
+                  <p:par>
+                    <p:cTn id="3" fill="hold">
+                      <p:stCondLst>
+                        <p:cond delay="indefinite"/>
+                      </p:stCondLst>
+                      <p:childTnLst>
+                        <p:par>
+                          <p:cTn id="4" fill="hold">
+                            <p:stCondLst>
+                              <p:cond delay="0"/>
+                            </p:stCondLst>
+                            <p:childTnLst>
+                              <p:par>
+                                <p:cTn id="5" presetID="10" presetClass="entr" presetSubtype="0" fill="hold" grpId="0" nodeType="clickEffect">
+                                  <p:stCondLst>
+                                    <p:cond delay="0"/>
+                                  </p:stCondLst>
+                                  <p:childTnLst>
+                                    <p:set>
+                                      <p:cBhvr>
+                                        <p:cTn id="6" dur="1" fill="hold">
+                                          <p:stCondLst>
+                                            <p:cond delay="0"/>
+                                          </p:stCondLst>
+                                        </p:cTn>
+                                        <p:tgtEl>
+                                          <p:spTgt spid="5"/>
+                                        </p:tgtEl>
+                                        <p:attrNameLst>
+                                          <p:attrName>style.visibility</p:attrName>
+                                        </p:attrNameLst>
+                                      </p:cBhvr>
+                                      <p:to>
+                                        <p:strVal val="visible"/>
+                                      </p:to>
+                                    </p:set>
+                                    <p:animEffect transition="in" filter="fade">
+                                      <p:cBhvr>
+                                        <p:cTn id="7" dur="500"/>
+                                        <p:tgtEl>
+                                          <p:spTgt spid="5"/>
+                                        </p:tgtEl>
+                                      </p:cBhvr>
+                                    </p:animEffect>
+                                  </p:childTnLst>
+                                </p:cTn>
+                              </p:par>
+                              <p:par>
+                                <p:cTn id="8" presetID="10" presetClass="entr" presetSubtype="0" fill="hold" grpId="0" nodeType="withEffect">
+                                  <p:stCondLst>
+                                    <p:cond delay="0"/>
+                                  </p:stCondLst>
+                                  <p:childTnLst>
+                                    <p:set>
+                                      <p:cBhvr>
+                                        <p:cTn id="9" dur="1" fill="hold">
+                                          <p:stCondLst>
+                                            <p:cond delay="0"/>
+                                          </p:stCondLst>
+                                        </p:cTn>
+                                        <p:tgtEl>
+                                          <p:spTgt spid="6"/>
+                                        </p:tgtEl>
+                                        <p:attrNameLst>
+                                          <p:attrName>style.visibility</p:attrName>
+                                        </p:attrNameLst>
+                                      </p:cBhvr>
+                                      <p:to>
+                                        <p:strVal val="visible"/>
+                                      </p:to>
+                                    </p:set>
+                                    <p:animEffect transition="in" filter="fade">
+                                      <p:cBhvr>
+                                        <p:cTn id="10" dur="500"/>
+                                        <p:tgtEl>
+                                          <p:spTgt spid="6"/>
+                                        </p:tgtEl>
+                                      </p:cBhvr>
+                                    </p:animEffect>
+                                  </p:childTnLst>
+                                </p:cTn>
+                              </p:par>
+                            </p:childTnLst>
+                          </p:cTn>
+                        </p:par>
+                      </p:childTnLst>
+                    </p:cTn>
+                  </p:par>
+                </p:childTnLst>
+              </p:cTn>
+              <p:prevCondLst>
+                <p:cond evt="onPrev" delay="0">
+                  <p:tgtEl>
+                    <p:sldTgt/>
+                  </p:tgtEl>
+                </p:cond>
+              </p:prevCondLst>
+              <p:nextCondLst>
+                <p:cond evt="onNext" delay="0">
+                  <p:tgtEl>
+                    <p:sldTgt/>
+                  </p:tgtEl>
+                </p:cond>
+              </p:nextCondLst>
+            </p:seq>
+          </p:childTnLst>
+        </p:cTn>
       </p:par>
     </p:tnLst>
+    <p:bldLst>
+      <p:bldP spid="5" grpId="0" animBg="1"/>
+      <p:bldP spid="6" grpId="0" animBg="1"/>
+    </p:bldLst>
   </p:timing>
 </p:sld>
 </file>
@@ -13580,6 +14172,13 @@
   <p:clrMapOvr>
     <a:masterClrMapping/>
   </p:clrMapOvr>
+  <p:timing>
+    <p:tnLst>
+      <p:par>
+        <p:cTn id="1" dur="indefinite" restart="never" nodeType="tmRoot"/>
+      </p:par>
+    </p:tnLst>
+  </p:timing>
 </p:sld>
 </file>
 

</xml_diff>